<commit_message>
Real end - 1
</commit_message>
<xml_diff>
--- a/제출용/3차 발표.pptx
+++ b/제출용/3차 발표.pptx
@@ -3869,11 +3869,11 @@
             <a:pPr algn="r"/>
             <a:r>
               <a:rPr lang="en-US" altLang="ko-KR" dirty="0"/>
-              <a:t>2DGP 2</a:t>
+              <a:t>2DGP </a:t>
             </a:r>
             <a:r>
               <a:rPr lang="ko-KR" altLang="en-US" dirty="0"/>
-              <a:t>차 발표</a:t>
+              <a:t>최종 발표</a:t>
             </a:r>
             <a:endParaRPr lang="en-US" altLang="ko-KR" dirty="0"/>
           </a:p>

</xml_diff>